<commit_message>
6/12 updates - Class 2
</commit_message>
<xml_diff>
--- a/Class Project.pptx
+++ b/Class Project.pptx
@@ -5,7 +5,7 @@
     <p:sldMasterId id="2147483660" r:id="rId1"/>
   </p:sldMasterIdLst>
   <p:notesMasterIdLst>
-    <p:notesMasterId r:id="rId8"/>
+    <p:notesMasterId r:id="rId7"/>
   </p:notesMasterIdLst>
   <p:sldIdLst>
     <p:sldId id="256" r:id="rId2"/>
@@ -13,42 +13,41 @@
     <p:sldId id="258" r:id="rId4"/>
     <p:sldId id="262" r:id="rId5"/>
     <p:sldId id="261" r:id="rId6"/>
-    <p:sldId id="263" r:id="rId7"/>
   </p:sldIdLst>
   <p:sldSz cx="12192000" cy="6858000"/>
   <p:notesSz cx="6858000" cy="9144000"/>
   <p:embeddedFontLst>
     <p:embeddedFont>
       <p:font typeface="Calibri" panose="020F0502020204030204" pitchFamily="34" charset="0"/>
-      <p:regular r:id="rId9"/>
-      <p:bold r:id="rId10"/>
-      <p:italic r:id="rId11"/>
-      <p:boldItalic r:id="rId12"/>
+      <p:regular r:id="rId8"/>
+      <p:bold r:id="rId9"/>
+      <p:italic r:id="rId10"/>
+      <p:boldItalic r:id="rId11"/>
     </p:embeddedFont>
     <p:embeddedFont>
       <p:font typeface="Calisto MT" panose="02040603050505030304" pitchFamily="18" charset="0"/>
-      <p:regular r:id="rId13"/>
-      <p:bold r:id="rId14"/>
-      <p:italic r:id="rId15"/>
-      <p:boldItalic r:id="rId16"/>
+      <p:regular r:id="rId12"/>
+      <p:bold r:id="rId13"/>
+      <p:italic r:id="rId14"/>
+      <p:boldItalic r:id="rId15"/>
     </p:embeddedFont>
     <p:embeddedFont>
       <p:font typeface="Lato" panose="020B0604020202020204" charset="0"/>
-      <p:regular r:id="rId17"/>
-      <p:bold r:id="rId18"/>
-      <p:italic r:id="rId19"/>
-      <p:boldItalic r:id="rId20"/>
+      <p:regular r:id="rId16"/>
+      <p:bold r:id="rId17"/>
+      <p:italic r:id="rId18"/>
+      <p:boldItalic r:id="rId19"/>
     </p:embeddedFont>
     <p:embeddedFont>
       <p:font typeface="Lustria" panose="020B0604020202020204" charset="0"/>
-      <p:regular r:id="rId21"/>
+      <p:regular r:id="rId20"/>
     </p:embeddedFont>
     <p:embeddedFont>
       <p:font typeface="Raleway" panose="020B0604020202020204" charset="0"/>
-      <p:regular r:id="rId22"/>
-      <p:bold r:id="rId23"/>
-      <p:italic r:id="rId24"/>
-      <p:boldItalic r:id="rId25"/>
+      <p:regular r:id="rId21"/>
+      <p:bold r:id="rId22"/>
+      <p:italic r:id="rId23"/>
+      <p:boldItalic r:id="rId24"/>
     </p:embeddedFont>
   </p:embeddedFontLst>
   <p:defaultTextStyle>
@@ -1790,7 +1789,7 @@
   <p:cSld>
     <p:spTree>
       <p:nvGrpSpPr>
-        <p:cNvPr id="1" name="Shape 130"/>
+        <p:cNvPr id="1" name="Shape 104"/>
         <p:cNvGrpSpPr/>
         <p:nvPr/>
       </p:nvGrpSpPr>
@@ -1804,7 +1803,7 @@
       </p:grpSpPr>
       <p:sp>
         <p:nvSpPr>
-          <p:cNvPr id="131" name="Google Shape;131;g4fe6ed41a2_0_439:notes"/>
+          <p:cNvPr id="105" name="Google Shape;105;g4fe6ed41a2_0_423:notes"/>
           <p:cNvSpPr txBox="1">
             <a:spLocks noGrp="1"/>
           </p:cNvSpPr>
@@ -1842,7 +1841,7 @@
       </p:sp>
       <p:sp>
         <p:nvSpPr>
-          <p:cNvPr id="132" name="Google Shape;132;g4fe6ed41a2_0_439:notes"/>
+          <p:cNvPr id="106" name="Google Shape;106;g4fe6ed41a2_0_423:notes"/>
           <p:cNvSpPr>
             <a:spLocks noGrp="1" noRot="1" noChangeAspect="1"/>
           </p:cNvSpPr>
@@ -1882,6 +1881,11 @@
         </p:spPr>
       </p:sp>
     </p:spTree>
+    <p:extLst>
+      <p:ext uri="{BB962C8B-B14F-4D97-AF65-F5344CB8AC3E}">
+        <p14:creationId xmlns:p14="http://schemas.microsoft.com/office/powerpoint/2010/main" val="207688436"/>
+      </p:ext>
+    </p:extLst>
   </p:cSld>
   <p:clrMapOvr>
     <a:masterClrMapping/>
@@ -2039,110 +2043,6 @@
       <p:sp>
         <p:nvSpPr>
           <p:cNvPr id="124" name="Google Shape;124;g4fe6ed41a2_0_443:notes"/>
-          <p:cNvSpPr>
-            <a:spLocks noGrp="1" noRot="1" noChangeAspect="1"/>
-          </p:cNvSpPr>
-          <p:nvPr>
-            <p:ph type="sldImg" idx="2"/>
-          </p:nvPr>
-        </p:nvSpPr>
-        <p:spPr>
-          <a:xfrm>
-            <a:off x="685800" y="1143000"/>
-            <a:ext cx="5486400" cy="3086100"/>
-          </a:xfrm>
-          <a:custGeom>
-            <a:avLst/>
-            <a:gdLst/>
-            <a:ahLst/>
-            <a:cxnLst/>
-            <a:rect l="l" t="t" r="r" b="b"/>
-            <a:pathLst>
-              <a:path w="120000" h="120000" extrusionOk="0">
-                <a:moveTo>
-                  <a:pt x="0" y="0"/>
-                </a:moveTo>
-                <a:lnTo>
-                  <a:pt x="120000" y="0"/>
-                </a:lnTo>
-                <a:lnTo>
-                  <a:pt x="120000" y="120000"/>
-                </a:lnTo>
-                <a:lnTo>
-                  <a:pt x="0" y="120000"/>
-                </a:lnTo>
-                <a:close/>
-              </a:path>
-            </a:pathLst>
-          </a:custGeom>
-        </p:spPr>
-      </p:sp>
-    </p:spTree>
-  </p:cSld>
-  <p:clrMapOvr>
-    <a:masterClrMapping/>
-  </p:clrMapOvr>
-</p:notes>
-</file>
-
-<file path=ppt/notesSlides/notesSlide6.xml><?xml version="1.0" encoding="utf-8"?>
-<p:notes xmlns:a="http://schemas.openxmlformats.org/drawingml/2006/main" xmlns:r="http://schemas.openxmlformats.org/officeDocument/2006/relationships" xmlns:p="http://schemas.openxmlformats.org/presentationml/2006/main" showMasterSp="0" showMasterPhAnim="0">
-  <p:cSld>
-    <p:spTree>
-      <p:nvGrpSpPr>
-        <p:cNvPr id="1" name="Shape 138"/>
-        <p:cNvGrpSpPr/>
-        <p:nvPr/>
-      </p:nvGrpSpPr>
-      <p:grpSpPr>
-        <a:xfrm>
-          <a:off x="0" y="0"/>
-          <a:ext cx="0" cy="0"/>
-          <a:chOff x="0" y="0"/>
-          <a:chExt cx="0" cy="0"/>
-        </a:xfrm>
-      </p:grpSpPr>
-      <p:sp>
-        <p:nvSpPr>
-          <p:cNvPr id="139" name="Google Shape;139;g4fe6ed41a2_0_447:notes"/>
-          <p:cNvSpPr txBox="1">
-            <a:spLocks noGrp="1"/>
-          </p:cNvSpPr>
-          <p:nvPr>
-            <p:ph type="body" idx="1"/>
-          </p:nvPr>
-        </p:nvSpPr>
-        <p:spPr>
-          <a:xfrm>
-            <a:off x="685800" y="4400550"/>
-            <a:ext cx="5486400" cy="3600600"/>
-          </a:xfrm>
-          <a:prstGeom prst="rect">
-            <a:avLst/>
-          </a:prstGeom>
-        </p:spPr>
-        <p:txBody>
-          <a:bodyPr spcFirstLastPara="1" wrap="square" lIns="91425" tIns="45700" rIns="91425" bIns="45700" anchor="t" anchorCtr="0">
-            <a:noAutofit/>
-          </a:bodyPr>
-          <a:lstStyle/>
-          <a:p>
-            <a:pPr marL="0" lvl="0" indent="0" algn="l" rtl="0">
-              <a:spcBef>
-                <a:spcPts val="0"/>
-              </a:spcBef>
-              <a:spcAft>
-                <a:spcPts val="0"/>
-              </a:spcAft>
-              <a:buNone/>
-            </a:pPr>
-            <a:endParaRPr/>
-          </a:p>
-        </p:txBody>
-      </p:sp>
-      <p:sp>
-        <p:nvSpPr>
-          <p:cNvPr id="140" name="Google Shape;140;g4fe6ed41a2_0_447:notes"/>
           <p:cNvSpPr>
             <a:spLocks noGrp="1" noRot="1" noChangeAspect="1"/>
           </p:cNvSpPr>
@@ -9922,7 +9822,7 @@
                 <a:cs typeface="Lato"/>
                 <a:sym typeface="Lato"/>
               </a:rPr>
-              <a:t>Build Model/Data Flow</a:t>
+              <a:t>Select Model, Build Model &amp; Create Data Flow</a:t>
             </a:r>
             <a:endParaRPr sz="2400" dirty="0">
               <a:solidFill>
@@ -10174,7 +10074,7 @@
             </a:r>
             <a:r>
               <a:rPr lang="en-US" sz="2400" dirty="0"/>
-              <a:t> Learn to explore,  (Class 3)</a:t>
+              <a:t> Learn to explore &amp; process dataset (Class 3)</a:t>
             </a:r>
             <a:endParaRPr sz="2400" dirty="0"/>
           </a:p>
@@ -10192,7 +10092,7 @@
             </a:pPr>
             <a:r>
               <a:rPr lang="en-US" sz="2400" dirty="0"/>
-              <a:t>Normalize data &amp; Create Data Model (Class 4)</a:t>
+              <a:t>Evaluate &amp; Select Word2Vec NLP Model(s) (Class 4)</a:t>
             </a:r>
             <a:endParaRPr sz="2400" dirty="0"/>
           </a:p>
@@ -10210,7 +10110,7 @@
             </a:pPr>
             <a:r>
               <a:rPr lang="en-US" sz="2400" dirty="0"/>
-              <a:t>Analyze Data Quality &amp; Create Data Dictionary (Class 5) </a:t>
+              <a:t>Build Word2Vec NLP Model (Class 5) </a:t>
             </a:r>
             <a:endParaRPr sz="2400" dirty="0"/>
           </a:p>
@@ -10228,7 +10128,7 @@
             </a:pPr>
             <a:r>
               <a:rPr lang="en-US" sz="2400" dirty="0"/>
-              <a:t>Automate data workflow using ETL, Python or Dataiku, Connect schema to Google Data Studio (Class 6) </a:t>
+              <a:t>Create Data Pipeline using Python and/or Dataiku (Class 6&amp;7)</a:t>
             </a:r>
             <a:endParaRPr sz="2400" dirty="0"/>
           </a:p>
@@ -10246,7 +10146,7 @@
             </a:pPr>
             <a:r>
               <a:rPr lang="en-US" sz="2400" dirty="0"/>
-              <a:t>Ask questions/finish project for professional portfolio (Class 7/8)</a:t>
+              <a:t>Ask questions/finish project for professional portfolio (Class 8)</a:t>
             </a:r>
             <a:endParaRPr sz="2400" dirty="0"/>
           </a:p>
@@ -10265,7 +10165,7 @@
   <p:cSld>
     <p:spTree>
       <p:nvGrpSpPr>
-        <p:cNvPr id="1" name="Shape 133"/>
+        <p:cNvPr id="1" name="Shape 107"/>
         <p:cNvGrpSpPr/>
         <p:nvPr/>
       </p:nvGrpSpPr>
@@ -10279,7 +10179,7 @@
       </p:grpSpPr>
       <p:sp>
         <p:nvSpPr>
-          <p:cNvPr id="134" name="Google Shape;134;p20"/>
+          <p:cNvPr id="108" name="Google Shape;108;p16"/>
           <p:cNvSpPr txBox="1">
             <a:spLocks noGrp="1"/>
           </p:cNvSpPr>
@@ -10328,235 +10228,575 @@
               <a:buNone/>
             </a:pPr>
             <a:r>
-              <a:rPr lang="en-US"/>
-              <a:t>Resources &amp; Recommendations</a:t>
+              <a:rPr lang="en-US" dirty="0"/>
+              <a:t>NLP Applications </a:t>
             </a:r>
-            <a:endParaRPr/>
+            <a:r>
+              <a:rPr lang="en-US" dirty="0">
+                <a:sym typeface="Wingdings" panose="05000000000000000000" pitchFamily="2" charset="2"/>
+              </a:rPr>
+              <a:t> NLP </a:t>
+            </a:r>
+            <a:r>
+              <a:rPr lang="en-US" dirty="0"/>
+              <a:t>Models</a:t>
+            </a:r>
+            <a:endParaRPr dirty="0"/>
           </a:p>
         </p:txBody>
       </p:sp>
-      <p:sp>
-        <p:nvSpPr>
-          <p:cNvPr id="137" name="Google Shape;137;p20"/>
-          <p:cNvSpPr txBox="1"/>
-          <p:nvPr/>
-        </p:nvSpPr>
-        <p:spPr>
-          <a:xfrm>
-            <a:off x="8627750" y="1630250"/>
-            <a:ext cx="3232800" cy="3000000"/>
-          </a:xfrm>
-          <a:prstGeom prst="rect">
-            <a:avLst/>
-          </a:prstGeom>
-          <a:noFill/>
-          <a:ln>
-            <a:noFill/>
-          </a:ln>
-        </p:spPr>
-        <p:txBody>
-          <a:bodyPr spcFirstLastPara="1" wrap="square" lIns="91425" tIns="91425" rIns="91425" bIns="91425" anchor="t" anchorCtr="0">
-            <a:noAutofit/>
-          </a:bodyPr>
-          <a:lstStyle/>
-          <a:p>
-            <a:pPr marL="342900" lvl="0" indent="0" algn="l" rtl="0">
-              <a:lnSpc>
-                <a:spcPct val="80000"/>
-              </a:lnSpc>
-              <a:spcBef>
-                <a:spcPts val="970"/>
-              </a:spcBef>
-              <a:spcAft>
-                <a:spcPts val="0"/>
-              </a:spcAft>
-              <a:buNone/>
-            </a:pPr>
-            <a:r>
-              <a:rPr lang="en-US" sz="1850" b="1" u="sng" dirty="0">
-                <a:solidFill>
-                  <a:schemeClr val="accent1"/>
-                </a:solidFill>
-                <a:latin typeface="Lato"/>
-                <a:ea typeface="Lato"/>
-                <a:cs typeface="Lato"/>
-                <a:sym typeface="Lato"/>
-              </a:rPr>
-              <a:t>Recommendations</a:t>
-            </a:r>
-            <a:endParaRPr sz="1850" b="1" u="sng" dirty="0">
-              <a:solidFill>
-                <a:schemeClr val="accent1"/>
-              </a:solidFill>
-              <a:latin typeface="Lato"/>
-              <a:ea typeface="Lato"/>
-              <a:cs typeface="Lato"/>
-              <a:sym typeface="Lato"/>
-            </a:endParaRPr>
-          </a:p>
-          <a:p>
-            <a:pPr marL="0" lvl="0" indent="0" algn="l" rtl="0">
-              <a:lnSpc>
-                <a:spcPct val="80000"/>
-              </a:lnSpc>
-              <a:spcBef>
-                <a:spcPts val="970"/>
-              </a:spcBef>
-              <a:spcAft>
-                <a:spcPts val="0"/>
-              </a:spcAft>
-              <a:buNone/>
-            </a:pPr>
-            <a:endParaRPr sz="1850" b="1" dirty="0">
-              <a:solidFill>
-                <a:schemeClr val="accent1"/>
-              </a:solidFill>
-              <a:latin typeface="Lato"/>
-              <a:ea typeface="Lato"/>
-              <a:cs typeface="Lato"/>
-              <a:sym typeface="Lato"/>
-            </a:endParaRPr>
-          </a:p>
-          <a:p>
-            <a:pPr marL="0" lvl="0" indent="0" algn="l" rtl="0">
-              <a:lnSpc>
-                <a:spcPct val="115000"/>
-              </a:lnSpc>
-              <a:spcBef>
-                <a:spcPts val="500"/>
-              </a:spcBef>
-              <a:spcAft>
-                <a:spcPts val="0"/>
-              </a:spcAft>
-              <a:buNone/>
-            </a:pPr>
-            <a:r>
-              <a:rPr lang="en-US" sz="2000" dirty="0">
-                <a:latin typeface="Lato"/>
-                <a:ea typeface="Lato"/>
-                <a:cs typeface="Lato"/>
-                <a:sym typeface="Lato"/>
-              </a:rPr>
-              <a:t>Find some data that interests you.</a:t>
-            </a:r>
-            <a:endParaRPr sz="2000" dirty="0">
-              <a:latin typeface="Lato"/>
-              <a:ea typeface="Lato"/>
-              <a:cs typeface="Lato"/>
-              <a:sym typeface="Lato"/>
-            </a:endParaRPr>
-          </a:p>
-          <a:p>
-            <a:pPr marL="0" lvl="0" indent="0" algn="l" rtl="0">
-              <a:lnSpc>
-                <a:spcPct val="115000"/>
-              </a:lnSpc>
-              <a:spcBef>
-                <a:spcPts val="600"/>
-              </a:spcBef>
-              <a:spcAft>
-                <a:spcPts val="0"/>
-              </a:spcAft>
-              <a:buClr>
-                <a:srgbClr val="000000"/>
-              </a:buClr>
-              <a:buSzPts val="1100"/>
-              <a:buFont typeface="Arial"/>
-              <a:buNone/>
-            </a:pPr>
-            <a:endParaRPr sz="2000" dirty="0">
-              <a:latin typeface="Lato"/>
-              <a:ea typeface="Lato"/>
-              <a:cs typeface="Lato"/>
-              <a:sym typeface="Lato"/>
-            </a:endParaRPr>
-          </a:p>
-          <a:p>
-            <a:pPr marL="0" lvl="0" indent="0" algn="l" rtl="0">
-              <a:lnSpc>
-                <a:spcPct val="115000"/>
-              </a:lnSpc>
-              <a:spcBef>
-                <a:spcPts val="600"/>
-              </a:spcBef>
-              <a:spcAft>
-                <a:spcPts val="0"/>
-              </a:spcAft>
-              <a:buNone/>
-            </a:pPr>
-            <a:r>
-              <a:rPr lang="en-US" sz="2000" dirty="0">
-                <a:latin typeface="Lato"/>
-                <a:ea typeface="Lato"/>
-                <a:cs typeface="Lato"/>
-                <a:sym typeface="Lato"/>
-              </a:rPr>
-              <a:t>Practice importing it into Workbench and cleaning it</a:t>
-            </a:r>
-            <a:endParaRPr sz="2000" dirty="0">
-              <a:latin typeface="Lato"/>
-              <a:ea typeface="Lato"/>
-              <a:cs typeface="Lato"/>
-              <a:sym typeface="Lato"/>
-            </a:endParaRPr>
-          </a:p>
-          <a:p>
-            <a:pPr marL="0" lvl="0" indent="0" algn="l" rtl="0">
-              <a:lnSpc>
-                <a:spcPct val="115000"/>
-              </a:lnSpc>
-              <a:spcBef>
-                <a:spcPts val="600"/>
-              </a:spcBef>
-              <a:spcAft>
-                <a:spcPts val="0"/>
-              </a:spcAft>
-              <a:buClr>
-                <a:srgbClr val="000000"/>
-              </a:buClr>
-              <a:buSzPts val="1100"/>
-              <a:buFont typeface="Arial"/>
-              <a:buNone/>
-            </a:pPr>
-            <a:endParaRPr sz="2000" dirty="0">
-              <a:latin typeface="Lato"/>
-              <a:ea typeface="Lato"/>
-              <a:cs typeface="Lato"/>
-              <a:sym typeface="Lato"/>
-            </a:endParaRPr>
-          </a:p>
-          <a:p>
-            <a:pPr marL="0" lvl="0" indent="0" algn="l" rtl="0">
-              <a:lnSpc>
-                <a:spcPct val="80000"/>
-              </a:lnSpc>
-              <a:spcBef>
-                <a:spcPts val="970"/>
-              </a:spcBef>
-              <a:spcAft>
-                <a:spcPts val="0"/>
-              </a:spcAft>
-              <a:buNone/>
-            </a:pPr>
-            <a:r>
-              <a:rPr lang="en-US" sz="2000" dirty="0">
-                <a:latin typeface="Lato"/>
-                <a:ea typeface="Lato"/>
-                <a:cs typeface="Lato"/>
-                <a:sym typeface="Lato"/>
-              </a:rPr>
-              <a:t>Document the process with git and sync with your GitHub account</a:t>
-            </a:r>
-            <a:endParaRPr sz="1850" b="1" dirty="0">
-              <a:latin typeface="Lato"/>
-              <a:ea typeface="Lato"/>
-              <a:cs typeface="Lato"/>
-              <a:sym typeface="Lato"/>
-            </a:endParaRPr>
-          </a:p>
-        </p:txBody>
-      </p:sp>
+      <p:graphicFrame>
+        <p:nvGraphicFramePr>
+          <p:cNvPr id="2" name="Table 1">
+            <a:extLst>
+              <a:ext uri="{FF2B5EF4-FFF2-40B4-BE49-F238E27FC236}">
+                <a16:creationId xmlns:a16="http://schemas.microsoft.com/office/drawing/2014/main" id="{1B5FA0E3-E46C-4B3A-9DC2-9157E213FEE9}"/>
+              </a:ext>
+            </a:extLst>
+          </p:cNvPr>
+          <p:cNvGraphicFramePr>
+            <a:graphicFrameLocks noGrp="1"/>
+          </p:cNvGraphicFramePr>
+          <p:nvPr>
+            <p:extLst>
+              <p:ext uri="{D42A27DB-BD31-4B8C-83A1-F6EECF244321}">
+                <p14:modId xmlns:p14="http://schemas.microsoft.com/office/powerpoint/2010/main" val="3708451227"/>
+              </p:ext>
+            </p:extLst>
+          </p:nvPr>
+        </p:nvGraphicFramePr>
+        <p:xfrm>
+          <a:off x="758536" y="1802239"/>
+          <a:ext cx="11087100" cy="4822848"/>
+        </p:xfrm>
+        <a:graphic>
+          <a:graphicData uri="http://schemas.openxmlformats.org/drawingml/2006/table">
+            <a:tbl>
+              <a:tblPr firstRow="1" bandRow="1">
+                <a:tableStyleId>{DF5F2CD0-9B1E-4284-AE1B-D078FEDE3D7A}</a:tableStyleId>
+              </a:tblPr>
+              <a:tblGrid>
+                <a:gridCol w="2316578">
+                  <a:extLst>
+                    <a:ext uri="{9D8B030D-6E8A-4147-A177-3AD203B41FA5}">
+                      <a16:colId xmlns:a16="http://schemas.microsoft.com/office/drawing/2014/main" val="10225000"/>
+                    </a:ext>
+                  </a:extLst>
+                </a:gridCol>
+                <a:gridCol w="5074821">
+                  <a:extLst>
+                    <a:ext uri="{9D8B030D-6E8A-4147-A177-3AD203B41FA5}">
+                      <a16:colId xmlns:a16="http://schemas.microsoft.com/office/drawing/2014/main" val="356255142"/>
+                    </a:ext>
+                  </a:extLst>
+                </a:gridCol>
+                <a:gridCol w="3695701">
+                  <a:extLst>
+                    <a:ext uri="{9D8B030D-6E8A-4147-A177-3AD203B41FA5}">
+                      <a16:colId xmlns:a16="http://schemas.microsoft.com/office/drawing/2014/main" val="1065519232"/>
+                    </a:ext>
+                  </a:extLst>
+                </a:gridCol>
+              </a:tblGrid>
+              <a:tr h="287924">
+                <a:tc>
+                  <a:txBody>
+                    <a:bodyPr/>
+                    <a:lstStyle/>
+                    <a:p>
+                      <a:r>
+                        <a:rPr lang="en-US" dirty="0"/>
+                        <a:t>Application</a:t>
+                      </a:r>
+                    </a:p>
+                  </a:txBody>
+                  <a:tcPr/>
+                </a:tc>
+                <a:tc>
+                  <a:txBody>
+                    <a:bodyPr/>
+                    <a:lstStyle/>
+                    <a:p>
+                      <a:r>
+                        <a:rPr lang="en-US" dirty="0"/>
+                        <a:t>Description</a:t>
+                      </a:r>
+                    </a:p>
+                  </a:txBody>
+                  <a:tcPr/>
+                </a:tc>
+                <a:tc>
+                  <a:txBody>
+                    <a:bodyPr/>
+                    <a:lstStyle/>
+                    <a:p>
+                      <a:r>
+                        <a:rPr lang="en-US" dirty="0"/>
+                        <a:t>NLP Model</a:t>
+                      </a:r>
+                    </a:p>
+                  </a:txBody>
+                  <a:tcPr/>
+                </a:tc>
+                <a:extLst>
+                  <a:ext uri="{0D108BD9-81ED-4DB2-BD59-A6C34878D82A}">
+                    <a16:rowId xmlns:a16="http://schemas.microsoft.com/office/drawing/2014/main" val="1673445470"/>
+                  </a:ext>
+                </a:extLst>
+              </a:tr>
+              <a:tr h="440572">
+                <a:tc>
+                  <a:txBody>
+                    <a:bodyPr/>
+                    <a:lstStyle/>
+                    <a:p>
+                      <a:pPr fontAlgn="base"/>
+                      <a:r>
+                        <a:rPr lang="en-US" dirty="0"/>
+                        <a:t>Text Classification</a:t>
+                      </a:r>
+                    </a:p>
+                    <a:p>
+                      <a:endParaRPr lang="en-US" dirty="0"/>
+                    </a:p>
+                  </a:txBody>
+                  <a:tcPr/>
+                </a:tc>
+                <a:tc>
+                  <a:txBody>
+                    <a:bodyPr/>
+                    <a:lstStyle/>
+                    <a:p>
+                      <a:r>
+                        <a:rPr lang="en-US" sz="1400" b="0" i="0" u="none" strike="noStrike" cap="none" dirty="0">
+                          <a:solidFill>
+                            <a:schemeClr val="dk1"/>
+                          </a:solidFill>
+                          <a:effectLst/>
+                          <a:latin typeface="Calisto MT"/>
+                          <a:ea typeface="Calisto MT"/>
+                          <a:cs typeface="Calisto MT"/>
+                          <a:sym typeface="Arial"/>
+                        </a:rPr>
+                        <a:t>Given an example of text, predict a predefined class label.</a:t>
+                      </a:r>
+                      <a:endParaRPr lang="en-US" dirty="0"/>
+                    </a:p>
+                  </a:txBody>
+                  <a:tcPr/>
+                </a:tc>
+                <a:tc>
+                  <a:txBody>
+                    <a:bodyPr/>
+                    <a:lstStyle/>
+                    <a:p>
+                      <a:r>
+                        <a:rPr lang="en-US" dirty="0"/>
+                        <a:t>Word2Vec – LDA &amp; LSA</a:t>
+                      </a:r>
+                    </a:p>
+                  </a:txBody>
+                  <a:tcPr/>
+                </a:tc>
+                <a:extLst>
+                  <a:ext uri="{0D108BD9-81ED-4DB2-BD59-A6C34878D82A}">
+                    <a16:rowId xmlns:a16="http://schemas.microsoft.com/office/drawing/2014/main" val="4126645047"/>
+                  </a:ext>
+                </a:extLst>
+              </a:tr>
+              <a:tr h="530656">
+                <a:tc>
+                  <a:txBody>
+                    <a:bodyPr/>
+                    <a:lstStyle/>
+                    <a:p>
+                      <a:pPr fontAlgn="base"/>
+                      <a:r>
+                        <a:rPr lang="en-US" dirty="0"/>
+                        <a:t>Language Modeling</a:t>
+                      </a:r>
+                    </a:p>
+                  </a:txBody>
+                  <a:tcPr/>
+                </a:tc>
+                <a:tc>
+                  <a:txBody>
+                    <a:bodyPr/>
+                    <a:lstStyle/>
+                    <a:p>
+                      <a:r>
+                        <a:rPr lang="en-US" dirty="0"/>
+                        <a:t>Predict the next word, given the previous words.</a:t>
+                      </a:r>
+                    </a:p>
+                  </a:txBody>
+                  <a:tcPr/>
+                </a:tc>
+                <a:tc>
+                  <a:txBody>
+                    <a:bodyPr/>
+                    <a:lstStyle/>
+                    <a:p>
+                      <a:r>
+                        <a:rPr lang="en-US" dirty="0" err="1"/>
+                        <a:t>SciKit</a:t>
+                      </a:r>
+                      <a:r>
+                        <a:rPr lang="en-US" dirty="0"/>
+                        <a:t> Learn – Language Identification</a:t>
+                      </a:r>
+                    </a:p>
+                  </a:txBody>
+                  <a:tcPr/>
+                </a:tc>
+                <a:extLst>
+                  <a:ext uri="{0D108BD9-81ED-4DB2-BD59-A6C34878D82A}">
+                    <a16:rowId xmlns:a16="http://schemas.microsoft.com/office/drawing/2014/main" val="1477203769"/>
+                  </a:ext>
+                </a:extLst>
+              </a:tr>
+              <a:tr h="530656">
+                <a:tc>
+                  <a:txBody>
+                    <a:bodyPr/>
+                    <a:lstStyle/>
+                    <a:p>
+                      <a:pPr fontAlgn="base"/>
+                      <a:r>
+                        <a:rPr lang="en-US" dirty="0"/>
+                        <a:t>Speech Recognition</a:t>
+                      </a:r>
+                    </a:p>
+                  </a:txBody>
+                  <a:tcPr/>
+                </a:tc>
+                <a:tc>
+                  <a:txBody>
+                    <a:bodyPr/>
+                    <a:lstStyle/>
+                    <a:p>
+                      <a:r>
+                        <a:rPr lang="en-US" dirty="0"/>
+                        <a:t>Understanding what was said by the speaker. </a:t>
+                      </a:r>
+                    </a:p>
+                  </a:txBody>
+                  <a:tcPr/>
+                </a:tc>
+                <a:tc>
+                  <a:txBody>
+                    <a:bodyPr/>
+                    <a:lstStyle/>
+                    <a:p>
+                      <a:r>
+                        <a:rPr lang="en-US" dirty="0"/>
+                        <a:t>Difficult – Need Speech Recognition Hardware</a:t>
+                      </a:r>
+                    </a:p>
+                  </a:txBody>
+                  <a:tcPr/>
+                </a:tc>
+                <a:extLst>
+                  <a:ext uri="{0D108BD9-81ED-4DB2-BD59-A6C34878D82A}">
+                    <a16:rowId xmlns:a16="http://schemas.microsoft.com/office/drawing/2014/main" val="281994992"/>
+                  </a:ext>
+                </a:extLst>
+              </a:tr>
+              <a:tr h="530656">
+                <a:tc>
+                  <a:txBody>
+                    <a:bodyPr/>
+                    <a:lstStyle/>
+                    <a:p>
+                      <a:pPr fontAlgn="base"/>
+                      <a:r>
+                        <a:rPr lang="en-US" dirty="0"/>
+                        <a:t>Caption Generation</a:t>
+                      </a:r>
+                    </a:p>
+                  </a:txBody>
+                  <a:tcPr/>
+                </a:tc>
+                <a:tc>
+                  <a:txBody>
+                    <a:bodyPr/>
+                    <a:lstStyle/>
+                    <a:p>
+                      <a:r>
+                        <a:rPr lang="en-US" sz="1400" b="0" i="0" u="none" strike="noStrike" cap="none" dirty="0">
+                          <a:solidFill>
+                            <a:schemeClr val="dk1"/>
+                          </a:solidFill>
+                          <a:effectLst/>
+                          <a:latin typeface="Calisto MT"/>
+                          <a:ea typeface="Calisto MT"/>
+                          <a:cs typeface="Calisto MT"/>
+                          <a:sym typeface="Arial"/>
+                        </a:rPr>
+                        <a:t>Given a digital image, such as a photo, generate a textual description of the contents of the image.</a:t>
+                      </a:r>
+                      <a:endParaRPr lang="en-US" dirty="0"/>
+                    </a:p>
+                  </a:txBody>
+                  <a:tcPr/>
+                </a:tc>
+                <a:tc>
+                  <a:txBody>
+                    <a:bodyPr/>
+                    <a:lstStyle/>
+                    <a:p>
+                      <a:r>
+                        <a:rPr lang="en-US" dirty="0" err="1"/>
+                        <a:t>Keras</a:t>
+                      </a:r>
+                      <a:r>
+                        <a:rPr lang="en-US" dirty="0"/>
+                        <a:t>/TensorFlow</a:t>
+                      </a:r>
+                    </a:p>
+                    <a:p>
+                      <a:r>
+                        <a:rPr lang="en-US" dirty="0">
+                          <a:hlinkClick r:id="rId3"/>
+                        </a:rPr>
+                        <a:t>https://machinelearningmastery.com/develop-a-deep-learning-caption-generation-model-in-python/</a:t>
+                      </a:r>
+                      <a:endParaRPr lang="en-US" dirty="0"/>
+                    </a:p>
+                  </a:txBody>
+                  <a:tcPr/>
+                </a:tc>
+                <a:extLst>
+                  <a:ext uri="{0D108BD9-81ED-4DB2-BD59-A6C34878D82A}">
+                    <a16:rowId xmlns:a16="http://schemas.microsoft.com/office/drawing/2014/main" val="1555582967"/>
+                  </a:ext>
+                </a:extLst>
+              </a:tr>
+              <a:tr h="530656">
+                <a:tc>
+                  <a:txBody>
+                    <a:bodyPr/>
+                    <a:lstStyle/>
+                    <a:p>
+                      <a:pPr fontAlgn="base"/>
+                      <a:r>
+                        <a:rPr lang="en-US" dirty="0"/>
+                        <a:t>Machine Translation</a:t>
+                      </a:r>
+                    </a:p>
+                  </a:txBody>
+                  <a:tcPr/>
+                </a:tc>
+                <a:tc>
+                  <a:txBody>
+                    <a:bodyPr/>
+                    <a:lstStyle/>
+                    <a:p>
+                      <a:r>
+                        <a:rPr lang="en-US" sz="1400" b="0" i="0" u="none" strike="noStrike" cap="none" dirty="0">
+                          <a:solidFill>
+                            <a:schemeClr val="dk1"/>
+                          </a:solidFill>
+                          <a:effectLst/>
+                          <a:latin typeface="Calisto MT"/>
+                          <a:ea typeface="Calisto MT"/>
+                          <a:cs typeface="Calisto MT"/>
+                          <a:sym typeface="Arial"/>
+                        </a:rPr>
+                        <a:t>Converting a source text in one language to another language.</a:t>
+                      </a:r>
+                      <a:endParaRPr lang="en-US" dirty="0"/>
+                    </a:p>
+                  </a:txBody>
+                  <a:tcPr/>
+                </a:tc>
+                <a:tc>
+                  <a:txBody>
+                    <a:bodyPr/>
+                    <a:lstStyle/>
+                    <a:p>
+                      <a:r>
+                        <a:rPr lang="en-US" dirty="0" err="1"/>
+                        <a:t>Keras</a:t>
+                      </a:r>
+                      <a:r>
+                        <a:rPr lang="en-US" dirty="0"/>
+                        <a:t>/</a:t>
+                      </a:r>
+                      <a:r>
+                        <a:rPr lang="en-US" dirty="0" err="1"/>
+                        <a:t>Tensorflow</a:t>
+                      </a:r>
+                      <a:endParaRPr lang="en-US" dirty="0"/>
+                    </a:p>
+                    <a:p>
+                      <a:r>
+                        <a:rPr lang="en-US" dirty="0">
+                          <a:hlinkClick r:id="rId4"/>
+                        </a:rPr>
+                        <a:t>https://towardsdatascience.com/neural-machine-translation-with-python-c2f0a34f7dd</a:t>
+                      </a:r>
+                      <a:endParaRPr lang="en-US" dirty="0"/>
+                    </a:p>
+                  </a:txBody>
+                  <a:tcPr/>
+                </a:tc>
+                <a:extLst>
+                  <a:ext uri="{0D108BD9-81ED-4DB2-BD59-A6C34878D82A}">
+                    <a16:rowId xmlns:a16="http://schemas.microsoft.com/office/drawing/2014/main" val="2448666974"/>
+                  </a:ext>
+                </a:extLst>
+              </a:tr>
+              <a:tr h="530656">
+                <a:tc>
+                  <a:txBody>
+                    <a:bodyPr/>
+                    <a:lstStyle/>
+                    <a:p>
+                      <a:pPr fontAlgn="base"/>
+                      <a:r>
+                        <a:rPr lang="en-US" dirty="0"/>
+                        <a:t>Document Summarization</a:t>
+                      </a:r>
+                    </a:p>
+                  </a:txBody>
+                  <a:tcPr/>
+                </a:tc>
+                <a:tc>
+                  <a:txBody>
+                    <a:bodyPr/>
+                    <a:lstStyle/>
+                    <a:p>
+                      <a:r>
+                        <a:rPr lang="en-US" sz="1400" b="0" i="0" u="none" strike="noStrike" cap="none" dirty="0">
+                          <a:solidFill>
+                            <a:schemeClr val="dk1"/>
+                          </a:solidFill>
+                          <a:effectLst/>
+                          <a:latin typeface="Calisto MT"/>
+                          <a:ea typeface="Calisto MT"/>
+                          <a:cs typeface="Calisto MT"/>
+                          <a:sym typeface="Arial"/>
+                        </a:rPr>
+                        <a:t>A short description of a text document is created.</a:t>
+                      </a:r>
+                      <a:endParaRPr lang="en-US" dirty="0"/>
+                    </a:p>
+                  </a:txBody>
+                  <a:tcPr/>
+                </a:tc>
+                <a:tc>
+                  <a:txBody>
+                    <a:bodyPr/>
+                    <a:lstStyle/>
+                    <a:p>
+                      <a:r>
+                        <a:rPr lang="en-US" dirty="0"/>
+                        <a:t>NLTK </a:t>
+                      </a:r>
+                      <a:r>
+                        <a:rPr lang="en-US" dirty="0">
+                          <a:hlinkClick r:id="rId5"/>
+                        </a:rPr>
+                        <a:t>https://stackabuse.com/text-summarization-with-nltk-in-python/</a:t>
+                      </a:r>
+                      <a:endParaRPr lang="en-US" dirty="0"/>
+                    </a:p>
+                  </a:txBody>
+                  <a:tcPr/>
+                </a:tc>
+                <a:extLst>
+                  <a:ext uri="{0D108BD9-81ED-4DB2-BD59-A6C34878D82A}">
+                    <a16:rowId xmlns:a16="http://schemas.microsoft.com/office/drawing/2014/main" val="441436929"/>
+                  </a:ext>
+                </a:extLst>
+              </a:tr>
+              <a:tr h="530656">
+                <a:tc>
+                  <a:txBody>
+                    <a:bodyPr/>
+                    <a:lstStyle/>
+                    <a:p>
+                      <a:pPr fontAlgn="base"/>
+                      <a:r>
+                        <a:rPr lang="en-US" dirty="0"/>
+                        <a:t>Question Answering</a:t>
+                      </a:r>
+                    </a:p>
+                  </a:txBody>
+                  <a:tcPr/>
+                </a:tc>
+                <a:tc>
+                  <a:txBody>
+                    <a:bodyPr/>
+                    <a:lstStyle/>
+                    <a:p>
+                      <a:r>
+                        <a:rPr lang="en-US" sz="1400" b="0" i="0" u="none" strike="noStrike" cap="none" dirty="0">
+                          <a:solidFill>
+                            <a:schemeClr val="dk1"/>
+                          </a:solidFill>
+                          <a:effectLst/>
+                          <a:latin typeface="Calisto MT"/>
+                          <a:ea typeface="Calisto MT"/>
+                          <a:cs typeface="Calisto MT"/>
+                          <a:sym typeface="Arial"/>
+                        </a:rPr>
+                        <a:t>Given a document of text, answer a specific question about the subject.</a:t>
+                      </a:r>
+                      <a:endParaRPr lang="en-US" dirty="0"/>
+                    </a:p>
+                  </a:txBody>
+                  <a:tcPr/>
+                </a:tc>
+                <a:tc>
+                  <a:txBody>
+                    <a:bodyPr/>
+                    <a:lstStyle/>
+                    <a:p>
+                      <a:r>
+                        <a:rPr lang="en-US" dirty="0" err="1"/>
+                        <a:t>Scikit</a:t>
+                      </a:r>
+                      <a:r>
+                        <a:rPr lang="en-US" dirty="0"/>
+                        <a:t> Learn – </a:t>
+                      </a:r>
+                      <a:r>
+                        <a:rPr lang="en-US" dirty="0" err="1"/>
+                        <a:t>SQuAD</a:t>
+                      </a:r>
+                      <a:r>
+                        <a:rPr lang="en-US"/>
+                        <a:t> Dataset </a:t>
+                      </a:r>
+                      <a:r>
+                        <a:rPr lang="en-US" dirty="0">
+                          <a:hlinkClick r:id="rId6"/>
+                        </a:rPr>
+                        <a:t>https://towardsdatascience.com/nlp-building-a-question-answering-model-ed0529a68c54</a:t>
+                      </a:r>
+                      <a:endParaRPr lang="en-US" dirty="0"/>
+                    </a:p>
+                  </a:txBody>
+                  <a:tcPr/>
+                </a:tc>
+                <a:extLst>
+                  <a:ext uri="{0D108BD9-81ED-4DB2-BD59-A6C34878D82A}">
+                    <a16:rowId xmlns:a16="http://schemas.microsoft.com/office/drawing/2014/main" val="2625020219"/>
+                  </a:ext>
+                </a:extLst>
+              </a:tr>
+            </a:tbl>
+          </a:graphicData>
+        </a:graphic>
+      </p:graphicFrame>
     </p:spTree>
+    <p:extLst>
+      <p:ext uri="{BB962C8B-B14F-4D97-AF65-F5344CB8AC3E}">
+        <p14:creationId xmlns:p14="http://schemas.microsoft.com/office/powerpoint/2010/main" val="20916212"/>
+      </p:ext>
+    </p:extLst>
   </p:cSld>
   <p:clrMapOvr>
     <a:masterClrMapping/>
@@ -10697,10 +10937,24 @@
               <a:buNone/>
             </a:pPr>
             <a:r>
-              <a:rPr lang="en-US" sz="1800" b="1" u="sng"/>
+              <a:rPr lang="en-US" sz="1800" b="1" u="sng" dirty="0"/>
               <a:t>Examples</a:t>
             </a:r>
-            <a:endParaRPr sz="1800" b="1" u="sng"/>
+          </a:p>
+          <a:p>
+            <a:pPr marL="609600" lvl="0" indent="0" algn="l" rtl="0">
+              <a:lnSpc>
+                <a:spcPct val="80000"/>
+              </a:lnSpc>
+              <a:spcBef>
+                <a:spcPts val="0"/>
+              </a:spcBef>
+              <a:spcAft>
+                <a:spcPts val="0"/>
+              </a:spcAft>
+              <a:buNone/>
+            </a:pPr>
+            <a:endParaRPr sz="1800" b="1" u="sng" dirty="0"/>
           </a:p>
           <a:p>
             <a:pPr marL="342900" lvl="0" indent="-351402" algn="l" rtl="0">
@@ -10717,7 +10971,7 @@
               <a:buChar char="●"/>
             </a:pPr>
             <a:r>
-              <a:rPr lang="en-US" sz="1800" u="sng">
+              <a:rPr lang="en-US" sz="1800" u="sng" dirty="0">
                 <a:solidFill>
                   <a:schemeClr val="hlink"/>
                 </a:solidFill>
@@ -10726,10 +10980,18 @@
               <a:t>Euro 2012</a:t>
             </a:r>
             <a:r>
-              <a:rPr lang="en-US" sz="1800"/>
-              <a:t> data (.sql)</a:t>
+              <a:rPr lang="en-US" sz="1800" dirty="0"/>
+              <a:t> data (.</a:t>
             </a:r>
-            <a:endParaRPr sz="1800"/>
+            <a:r>
+              <a:rPr lang="en-US" sz="1800" dirty="0" err="1"/>
+              <a:t>sql</a:t>
+            </a:r>
+            <a:r>
+              <a:rPr lang="en-US" sz="1800" dirty="0"/>
+              <a:t>)</a:t>
+            </a:r>
+            <a:endParaRPr sz="1800" dirty="0"/>
           </a:p>
           <a:p>
             <a:pPr marL="342900" lvl="0" indent="-351402" algn="l" rtl="0">
@@ -10746,7 +11008,7 @@
               <a:buChar char="●"/>
             </a:pPr>
             <a:r>
-              <a:rPr lang="en-US" sz="1800" u="sng">
+              <a:rPr lang="en-US" sz="1800" u="sng" dirty="0">
                 <a:solidFill>
                   <a:schemeClr val="hlink"/>
                 </a:solidFill>
@@ -10755,10 +11017,10 @@
               <a:t>Consumer complaints</a:t>
             </a:r>
             <a:r>
-              <a:rPr lang="en-US" sz="1800"/>
+              <a:rPr lang="en-US" sz="1800" dirty="0"/>
               <a:t> data (.csv)</a:t>
             </a:r>
-            <a:endParaRPr sz="1800"/>
+            <a:endParaRPr sz="1800" dirty="0"/>
           </a:p>
           <a:p>
             <a:pPr marL="342900" lvl="0" indent="-351402" algn="l" rtl="0">
@@ -10775,10 +11037,10 @@
               <a:buChar char="●"/>
             </a:pPr>
             <a:r>
-              <a:rPr lang="en-US" sz="1800"/>
+              <a:rPr lang="en-US" sz="1800" dirty="0"/>
               <a:t>Veterinary clinic data (.csv)</a:t>
             </a:r>
-            <a:endParaRPr sz="1800"/>
+            <a:endParaRPr sz="1800" dirty="0"/>
           </a:p>
           <a:p>
             <a:pPr marL="719999" lvl="1" indent="-322291" algn="l" rtl="0">
@@ -10795,7 +11057,7 @@
               <a:buChar char="○"/>
             </a:pPr>
             <a:r>
-              <a:rPr lang="en-US" sz="1800" u="sng">
+              <a:rPr lang="en-US" sz="1800" u="sng" dirty="0">
                 <a:solidFill>
                   <a:schemeClr val="hlink"/>
                 </a:solidFill>
@@ -10803,7 +11065,7 @@
               </a:rPr>
               <a:t>Pets</a:t>
             </a:r>
-            <a:endParaRPr sz="1800"/>
+            <a:endParaRPr sz="1800" dirty="0"/>
           </a:p>
           <a:p>
             <a:pPr marL="719999" lvl="1" indent="-322291" algn="l" rtl="0">
@@ -10820,7 +11082,7 @@
               <a:buChar char="○"/>
             </a:pPr>
             <a:r>
-              <a:rPr lang="en-US" sz="1800" u="sng">
+              <a:rPr lang="en-US" sz="1800" u="sng" dirty="0">
                 <a:solidFill>
                   <a:schemeClr val="hlink"/>
                 </a:solidFill>
@@ -10828,7 +11090,7 @@
               </a:rPr>
               <a:t>Owners</a:t>
             </a:r>
-            <a:endParaRPr sz="1800"/>
+            <a:endParaRPr sz="1800" dirty="0"/>
           </a:p>
           <a:p>
             <a:pPr marL="719999" lvl="1" indent="-322291" algn="l" rtl="0">
@@ -10845,7 +11107,7 @@
               <a:buChar char="○"/>
             </a:pPr>
             <a:r>
-              <a:rPr lang="en-US" sz="1800" u="sng">
+              <a:rPr lang="en-US" sz="1800" u="sng" dirty="0">
                 <a:solidFill>
                   <a:schemeClr val="hlink"/>
                 </a:solidFill>
@@ -10853,7 +11115,7 @@
               </a:rPr>
               <a:t>Procedures history</a:t>
             </a:r>
-            <a:endParaRPr sz="1800"/>
+            <a:endParaRPr sz="1800" dirty="0"/>
           </a:p>
           <a:p>
             <a:pPr marL="719999" lvl="1" indent="-322291" algn="l" rtl="0">
@@ -10870,7 +11132,7 @@
               <a:buChar char="○"/>
             </a:pPr>
             <a:r>
-              <a:rPr lang="en-US" sz="1800" u="sng">
+              <a:rPr lang="en-US" sz="1800" u="sng" dirty="0">
                 <a:solidFill>
                   <a:schemeClr val="hlink"/>
                 </a:solidFill>
@@ -10878,7 +11140,7 @@
               </a:rPr>
               <a:t>Procedures details</a:t>
             </a:r>
-            <a:endParaRPr sz="1800"/>
+            <a:endParaRPr sz="1800" dirty="0"/>
           </a:p>
           <a:p>
             <a:pPr marL="342900" lvl="0" indent="-351402" algn="l" rtl="0">
@@ -10895,10 +11157,10 @@
               <a:buChar char="●"/>
             </a:pPr>
             <a:r>
-              <a:rPr lang="en-US" sz="1800"/>
+              <a:rPr lang="en-US" sz="1800" dirty="0"/>
               <a:t>Console data (.csv)</a:t>
             </a:r>
-            <a:endParaRPr sz="1800"/>
+            <a:endParaRPr sz="1800" dirty="0"/>
           </a:p>
           <a:p>
             <a:pPr marL="719999" lvl="1" indent="-322291" algn="l" rtl="0">
@@ -10915,7 +11177,7 @@
               <a:buChar char="○"/>
             </a:pPr>
             <a:r>
-              <a:rPr lang="en-US" sz="1800" u="sng">
+              <a:rPr lang="en-US" sz="1800" u="sng" dirty="0">
                 <a:solidFill>
                   <a:schemeClr val="hlink"/>
                 </a:solidFill>
@@ -10923,7 +11185,7 @@
               </a:rPr>
               <a:t>Game sales</a:t>
             </a:r>
-            <a:endParaRPr sz="1800"/>
+            <a:endParaRPr sz="1800" dirty="0"/>
           </a:p>
           <a:p>
             <a:pPr marL="719999" lvl="1" indent="-322291" algn="l" rtl="0">
@@ -10940,7 +11202,7 @@
               <a:buChar char="○"/>
             </a:pPr>
             <a:r>
-              <a:rPr lang="en-US" sz="1800" u="sng">
+              <a:rPr lang="en-US" sz="1800" u="sng" dirty="0">
                 <a:solidFill>
                   <a:schemeClr val="hlink"/>
                 </a:solidFill>
@@ -10948,7 +11210,7 @@
               </a:rPr>
               <a:t>Console dates</a:t>
             </a:r>
-            <a:endParaRPr sz="1800"/>
+            <a:endParaRPr sz="1800" dirty="0"/>
           </a:p>
         </p:txBody>
       </p:sp>
@@ -11038,733 +11300,6 @@
           </a:p>
         </p:txBody>
       </p:sp>
-    </p:spTree>
-  </p:cSld>
-  <p:clrMapOvr>
-    <a:masterClrMapping/>
-  </p:clrMapOvr>
-</p:sld>
-</file>
-
-<file path=ppt/slides/slide6.xml><?xml version="1.0" encoding="utf-8"?>
-<p:sld xmlns:a="http://schemas.openxmlformats.org/drawingml/2006/main" xmlns:r="http://schemas.openxmlformats.org/officeDocument/2006/relationships" xmlns:p="http://schemas.openxmlformats.org/presentationml/2006/main">
-  <p:cSld>
-    <p:spTree>
-      <p:nvGrpSpPr>
-        <p:cNvPr id="1" name="Shape 141"/>
-        <p:cNvGrpSpPr/>
-        <p:nvPr/>
-      </p:nvGrpSpPr>
-      <p:grpSpPr>
-        <a:xfrm>
-          <a:off x="0" y="0"/>
-          <a:ext cx="0" cy="0"/>
-          <a:chOff x="0" y="0"/>
-          <a:chExt cx="0" cy="0"/>
-        </a:xfrm>
-      </p:grpSpPr>
-      <p:sp>
-        <p:nvSpPr>
-          <p:cNvPr id="142" name="Google Shape;142;p21"/>
-          <p:cNvSpPr txBox="1">
-            <a:spLocks noGrp="1"/>
-          </p:cNvSpPr>
-          <p:nvPr>
-            <p:ph type="title" idx="4294967295"/>
-          </p:nvPr>
-        </p:nvSpPr>
-        <p:spPr>
-          <a:xfrm>
-            <a:off x="913795" y="609600"/>
-            <a:ext cx="10353900" cy="970500"/>
-          </a:xfrm>
-          <a:prstGeom prst="rect">
-            <a:avLst/>
-          </a:prstGeom>
-          <a:noFill/>
-          <a:ln>
-            <a:noFill/>
-          </a:ln>
-          <a:effectLst>
-            <a:outerShdw blurRad="25400">
-              <a:srgbClr val="000000">
-                <a:alpha val="45880"/>
-              </a:srgbClr>
-            </a:outerShdw>
-          </a:effectLst>
-        </p:spPr>
-        <p:txBody>
-          <a:bodyPr spcFirstLastPara="1" wrap="square" lIns="91425" tIns="45700" rIns="91425" bIns="45700" anchor="ctr" anchorCtr="0">
-            <a:noAutofit/>
-          </a:bodyPr>
-          <a:lstStyle/>
-          <a:p>
-            <a:pPr marL="0" lvl="0" indent="0" algn="l" rtl="0">
-              <a:spcBef>
-                <a:spcPts val="0"/>
-              </a:spcBef>
-              <a:spcAft>
-                <a:spcPts val="0"/>
-              </a:spcAft>
-              <a:buClr>
-                <a:schemeClr val="lt2"/>
-              </a:buClr>
-              <a:buSzPts val="4000"/>
-              <a:buFont typeface="Lustria"/>
-              <a:buNone/>
-            </a:pPr>
-            <a:r>
-              <a:rPr lang="en-US"/>
-              <a:t>Rubric</a:t>
-            </a:r>
-            <a:endParaRPr/>
-          </a:p>
-        </p:txBody>
-      </p:sp>
-      <p:graphicFrame>
-        <p:nvGraphicFramePr>
-          <p:cNvPr id="143" name="Google Shape;143;p21"/>
-          <p:cNvGraphicFramePr/>
-          <p:nvPr/>
-        </p:nvGraphicFramePr>
-        <p:xfrm>
-          <a:off x="1127550" y="1981250"/>
-          <a:ext cx="10353150" cy="4330750"/>
-        </p:xfrm>
-        <a:graphic>
-          <a:graphicData uri="http://schemas.openxmlformats.org/drawingml/2006/table">
-            <a:tbl>
-              <a:tblPr firstRow="1" bandRow="1">
-                <a:noFill/>
-                <a:tableStyleId>{DF5F2CD0-9B1E-4284-AE1B-D078FEDE3D7A}</a:tableStyleId>
-              </a:tblPr>
-              <a:tblGrid>
-                <a:gridCol w="3375750">
-                  <a:extLst>
-                    <a:ext uri="{9D8B030D-6E8A-4147-A177-3AD203B41FA5}">
-                      <a16:colId xmlns:a16="http://schemas.microsoft.com/office/drawing/2014/main" val="20000"/>
-                    </a:ext>
-                  </a:extLst>
-                </a:gridCol>
-                <a:gridCol w="6977400">
-                  <a:extLst>
-                    <a:ext uri="{9D8B030D-6E8A-4147-A177-3AD203B41FA5}">
-                      <a16:colId xmlns:a16="http://schemas.microsoft.com/office/drawing/2014/main" val="20001"/>
-                    </a:ext>
-                  </a:extLst>
-                </a:gridCol>
-              </a:tblGrid>
-              <a:tr h="380425">
-                <a:tc>
-                  <a:txBody>
-                    <a:bodyPr/>
-                    <a:lstStyle/>
-                    <a:p>
-                      <a:pPr marL="0" marR="0" lvl="0" indent="0" algn="l" rtl="0">
-                        <a:spcBef>
-                          <a:spcPts val="0"/>
-                        </a:spcBef>
-                        <a:spcAft>
-                          <a:spcPts val="0"/>
-                        </a:spcAft>
-                        <a:buNone/>
-                      </a:pPr>
-                      <a:endParaRPr sz="1800"/>
-                    </a:p>
-                  </a:txBody>
-                  <a:tcPr marL="91450" marR="91450" marT="45725" marB="45725"/>
-                </a:tc>
-                <a:tc>
-                  <a:txBody>
-                    <a:bodyPr/>
-                    <a:lstStyle/>
-                    <a:p>
-                      <a:pPr marL="0" marR="0" lvl="0" indent="0" algn="l" rtl="0">
-                        <a:spcBef>
-                          <a:spcPts val="0"/>
-                        </a:spcBef>
-                        <a:spcAft>
-                          <a:spcPts val="0"/>
-                        </a:spcAft>
-                        <a:buNone/>
-                      </a:pPr>
-                      <a:r>
-                        <a:rPr lang="en-US" sz="1800"/>
-                        <a:t>Sufficient</a:t>
-                      </a:r>
-                      <a:endParaRPr/>
-                    </a:p>
-                  </a:txBody>
-                  <a:tcPr marL="91450" marR="91450" marT="45725" marB="45725"/>
-                </a:tc>
-                <a:extLst>
-                  <a:ext uri="{0D108BD9-81ED-4DB2-BD59-A6C34878D82A}">
-                    <a16:rowId xmlns:a16="http://schemas.microsoft.com/office/drawing/2014/main" val="10000"/>
-                  </a:ext>
-                </a:extLst>
-              </a:tr>
-              <a:tr h="951400">
-                <a:tc>
-                  <a:txBody>
-                    <a:bodyPr/>
-                    <a:lstStyle/>
-                    <a:p>
-                      <a:pPr marL="0" marR="0" lvl="0" indent="0" algn="l" rtl="0">
-                        <a:spcBef>
-                          <a:spcPts val="0"/>
-                        </a:spcBef>
-                        <a:spcAft>
-                          <a:spcPts val="0"/>
-                        </a:spcAft>
-                        <a:buNone/>
-                      </a:pPr>
-                      <a:r>
-                        <a:rPr lang="en-US" sz="1800">
-                          <a:solidFill>
-                            <a:srgbClr val="000000"/>
-                          </a:solidFill>
-                        </a:rPr>
-                        <a:t>Documentation</a:t>
-                      </a:r>
-                      <a:endParaRPr>
-                        <a:solidFill>
-                          <a:srgbClr val="000000"/>
-                        </a:solidFill>
-                      </a:endParaRPr>
-                    </a:p>
-                  </a:txBody>
-                  <a:tcPr marL="91450" marR="91450" marT="45725" marB="45725"/>
-                </a:tc>
-                <a:tc>
-                  <a:txBody>
-                    <a:bodyPr/>
-                    <a:lstStyle/>
-                    <a:p>
-                      <a:pPr marL="0" marR="0" lvl="0" indent="0" algn="l" rtl="0">
-                        <a:spcBef>
-                          <a:spcPts val="0"/>
-                        </a:spcBef>
-                        <a:spcAft>
-                          <a:spcPts val="0"/>
-                        </a:spcAft>
-                        <a:buNone/>
-                      </a:pPr>
-                      <a:r>
-                        <a:rPr lang="en-US" sz="1800">
-                          <a:solidFill>
-                            <a:srgbClr val="000000"/>
-                          </a:solidFill>
-                        </a:rPr>
-                        <a:t>Comments clarify complex code. </a:t>
-                      </a:r>
-                      <a:endParaRPr>
-                        <a:solidFill>
-                          <a:srgbClr val="000000"/>
-                        </a:solidFill>
-                      </a:endParaRPr>
-                    </a:p>
-                    <a:p>
-                      <a:pPr marL="0" marR="0" lvl="0" indent="0" algn="l" rtl="0">
-                        <a:spcBef>
-                          <a:spcPts val="0"/>
-                        </a:spcBef>
-                        <a:spcAft>
-                          <a:spcPts val="0"/>
-                        </a:spcAft>
-                        <a:buNone/>
-                      </a:pPr>
-                      <a:r>
-                        <a:rPr lang="en-US" sz="1800">
-                          <a:solidFill>
-                            <a:srgbClr val="000000"/>
-                          </a:solidFill>
-                        </a:rPr>
-                        <a:t>Object names are intuitive.</a:t>
-                      </a:r>
-                      <a:endParaRPr>
-                        <a:solidFill>
-                          <a:srgbClr val="000000"/>
-                        </a:solidFill>
-                      </a:endParaRPr>
-                    </a:p>
-                    <a:p>
-                      <a:pPr marL="0" marR="0" lvl="0" indent="0" algn="l" rtl="0">
-                        <a:spcBef>
-                          <a:spcPts val="0"/>
-                        </a:spcBef>
-                        <a:spcAft>
-                          <a:spcPts val="0"/>
-                        </a:spcAft>
-                        <a:buNone/>
-                      </a:pPr>
-                      <a:r>
-                        <a:rPr lang="en-US" sz="1800">
-                          <a:solidFill>
-                            <a:srgbClr val="000000"/>
-                          </a:solidFill>
-                        </a:rPr>
-                        <a:t>Code is easy to read.</a:t>
-                      </a:r>
-                      <a:endParaRPr>
-                        <a:solidFill>
-                          <a:srgbClr val="000000"/>
-                        </a:solidFill>
-                      </a:endParaRPr>
-                    </a:p>
-                  </a:txBody>
-                  <a:tcPr marL="91450" marR="91450" marT="45725" marB="45725"/>
-                </a:tc>
-                <a:extLst>
-                  <a:ext uri="{0D108BD9-81ED-4DB2-BD59-A6C34878D82A}">
-                    <a16:rowId xmlns:a16="http://schemas.microsoft.com/office/drawing/2014/main" val="10001"/>
-                  </a:ext>
-                </a:extLst>
-              </a:tr>
-              <a:tr h="683575">
-                <a:tc>
-                  <a:txBody>
-                    <a:bodyPr/>
-                    <a:lstStyle/>
-                    <a:p>
-                      <a:pPr marL="0" marR="0" lvl="0" indent="0" algn="l" rtl="0">
-                        <a:spcBef>
-                          <a:spcPts val="0"/>
-                        </a:spcBef>
-                        <a:spcAft>
-                          <a:spcPts val="0"/>
-                        </a:spcAft>
-                        <a:buNone/>
-                      </a:pPr>
-                      <a:r>
-                        <a:rPr lang="en-US" sz="1800">
-                          <a:solidFill>
-                            <a:srgbClr val="000000"/>
-                          </a:solidFill>
-                        </a:rPr>
-                        <a:t>Problem Formulation</a:t>
-                      </a:r>
-                      <a:endParaRPr>
-                        <a:solidFill>
-                          <a:srgbClr val="000000"/>
-                        </a:solidFill>
-                      </a:endParaRPr>
-                    </a:p>
-                  </a:txBody>
-                  <a:tcPr marL="91450" marR="91450" marT="45725" marB="45725"/>
-                </a:tc>
-                <a:tc>
-                  <a:txBody>
-                    <a:bodyPr/>
-                    <a:lstStyle/>
-                    <a:p>
-                      <a:pPr marL="0" marR="0" lvl="0" indent="0" algn="l" rtl="0">
-                        <a:spcBef>
-                          <a:spcPts val="0"/>
-                        </a:spcBef>
-                        <a:spcAft>
-                          <a:spcPts val="0"/>
-                        </a:spcAft>
-                        <a:buNone/>
-                      </a:pPr>
-                      <a:r>
-                        <a:rPr lang="en-US" sz="1800">
-                          <a:solidFill>
-                            <a:srgbClr val="000000"/>
-                          </a:solidFill>
-                        </a:rPr>
-                        <a:t>Questions are relevant and answerable by the available data.</a:t>
-                      </a:r>
-                      <a:endParaRPr>
-                        <a:solidFill>
-                          <a:srgbClr val="000000"/>
-                        </a:solidFill>
-                      </a:endParaRPr>
-                    </a:p>
-                    <a:p>
-                      <a:pPr marL="0" marR="0" lvl="0" indent="0" algn="l" rtl="0">
-                        <a:spcBef>
-                          <a:spcPts val="0"/>
-                        </a:spcBef>
-                        <a:spcAft>
-                          <a:spcPts val="0"/>
-                        </a:spcAft>
-                        <a:buNone/>
-                      </a:pPr>
-                      <a:r>
-                        <a:rPr lang="en-US" sz="1800">
-                          <a:solidFill>
-                            <a:srgbClr val="000000"/>
-                          </a:solidFill>
-                        </a:rPr>
-                        <a:t>Answers enable a decision by an interested party.</a:t>
-                      </a:r>
-                      <a:endParaRPr>
-                        <a:solidFill>
-                          <a:srgbClr val="000000"/>
-                        </a:solidFill>
-                      </a:endParaRPr>
-                    </a:p>
-                  </a:txBody>
-                  <a:tcPr marL="91450" marR="91450" marT="45725" marB="45725"/>
-                </a:tc>
-                <a:extLst>
-                  <a:ext uri="{0D108BD9-81ED-4DB2-BD59-A6C34878D82A}">
-                    <a16:rowId xmlns:a16="http://schemas.microsoft.com/office/drawing/2014/main" val="10002"/>
-                  </a:ext>
-                </a:extLst>
-              </a:tr>
-              <a:tr h="380425">
-                <a:tc>
-                  <a:txBody>
-                    <a:bodyPr/>
-                    <a:lstStyle/>
-                    <a:p>
-                      <a:pPr marL="0" marR="0" lvl="0" indent="0" algn="l" rtl="0">
-                        <a:spcBef>
-                          <a:spcPts val="0"/>
-                        </a:spcBef>
-                        <a:spcAft>
-                          <a:spcPts val="0"/>
-                        </a:spcAft>
-                        <a:buNone/>
-                      </a:pPr>
-                      <a:r>
-                        <a:rPr lang="en-US" sz="1800">
-                          <a:solidFill>
-                            <a:srgbClr val="000000"/>
-                          </a:solidFill>
-                        </a:rPr>
-                        <a:t>Database Design*</a:t>
-                      </a:r>
-                      <a:endParaRPr>
-                        <a:solidFill>
-                          <a:srgbClr val="000000"/>
-                        </a:solidFill>
-                      </a:endParaRPr>
-                    </a:p>
-                  </a:txBody>
-                  <a:tcPr marL="91450" marR="91450" marT="45725" marB="45725"/>
-                </a:tc>
-                <a:tc>
-                  <a:txBody>
-                    <a:bodyPr/>
-                    <a:lstStyle/>
-                    <a:p>
-                      <a:pPr marL="0" marR="0" lvl="0" indent="0" algn="l" rtl="0">
-                        <a:spcBef>
-                          <a:spcPts val="0"/>
-                        </a:spcBef>
-                        <a:spcAft>
-                          <a:spcPts val="0"/>
-                        </a:spcAft>
-                        <a:buNone/>
-                      </a:pPr>
-                      <a:r>
-                        <a:rPr lang="en-US" sz="1800">
-                          <a:solidFill>
-                            <a:srgbClr val="000000"/>
-                          </a:solidFill>
-                        </a:rPr>
-                        <a:t>All tables adhere to 1NF.</a:t>
-                      </a:r>
-                      <a:endParaRPr>
-                        <a:solidFill>
-                          <a:srgbClr val="000000"/>
-                        </a:solidFill>
-                      </a:endParaRPr>
-                    </a:p>
-                    <a:p>
-                      <a:pPr marL="0" marR="0" lvl="0" indent="0" algn="l" rtl="0">
-                        <a:spcBef>
-                          <a:spcPts val="0"/>
-                        </a:spcBef>
-                        <a:spcAft>
-                          <a:spcPts val="0"/>
-                        </a:spcAft>
-                        <a:buNone/>
-                      </a:pPr>
-                      <a:r>
-                        <a:rPr lang="en-US" sz="1800">
-                          <a:solidFill>
-                            <a:srgbClr val="000000"/>
-                          </a:solidFill>
-                        </a:rPr>
-                        <a:t>All tables are connected to at least one table.</a:t>
-                      </a:r>
-                      <a:endParaRPr>
-                        <a:solidFill>
-                          <a:srgbClr val="000000"/>
-                        </a:solidFill>
-                      </a:endParaRPr>
-                    </a:p>
-                    <a:p>
-                      <a:pPr marL="0" marR="0" lvl="0" indent="0" algn="l" rtl="0">
-                        <a:spcBef>
-                          <a:spcPts val="0"/>
-                        </a:spcBef>
-                        <a:spcAft>
-                          <a:spcPts val="0"/>
-                        </a:spcAft>
-                        <a:buNone/>
-                      </a:pPr>
-                      <a:r>
-                        <a:rPr lang="en-US" sz="1800">
-                          <a:solidFill>
-                            <a:srgbClr val="000000"/>
-                          </a:solidFill>
-                        </a:rPr>
-                        <a:t>Database schema adheres to an appropriate schema.</a:t>
-                      </a:r>
-                      <a:endParaRPr>
-                        <a:solidFill>
-                          <a:srgbClr val="000000"/>
-                        </a:solidFill>
-                      </a:endParaRPr>
-                    </a:p>
-                  </a:txBody>
-                  <a:tcPr marL="91450" marR="91450" marT="45725" marB="45725"/>
-                </a:tc>
-                <a:extLst>
-                  <a:ext uri="{0D108BD9-81ED-4DB2-BD59-A6C34878D82A}">
-                    <a16:rowId xmlns:a16="http://schemas.microsoft.com/office/drawing/2014/main" val="10003"/>
-                  </a:ext>
-                </a:extLst>
-              </a:tr>
-              <a:tr h="380425">
-                <a:tc>
-                  <a:txBody>
-                    <a:bodyPr/>
-                    <a:lstStyle/>
-                    <a:p>
-                      <a:pPr marL="0" marR="0" lvl="0" indent="0" algn="l" rtl="0">
-                        <a:spcBef>
-                          <a:spcPts val="0"/>
-                        </a:spcBef>
-                        <a:spcAft>
-                          <a:spcPts val="0"/>
-                        </a:spcAft>
-                        <a:buNone/>
-                      </a:pPr>
-                      <a:r>
-                        <a:rPr lang="en-US" sz="1800">
-                          <a:solidFill>
-                            <a:srgbClr val="000000"/>
-                          </a:solidFill>
-                        </a:rPr>
-                        <a:t>Data Cleanliness</a:t>
-                      </a:r>
-                      <a:endParaRPr>
-                        <a:solidFill>
-                          <a:srgbClr val="000000"/>
-                        </a:solidFill>
-                      </a:endParaRPr>
-                    </a:p>
-                  </a:txBody>
-                  <a:tcPr marL="91450" marR="91450" marT="45725" marB="45725"/>
-                </a:tc>
-                <a:tc>
-                  <a:txBody>
-                    <a:bodyPr/>
-                    <a:lstStyle/>
-                    <a:p>
-                      <a:pPr marL="0" marR="0" lvl="0" indent="0" algn="l" rtl="0">
-                        <a:spcBef>
-                          <a:spcPts val="0"/>
-                        </a:spcBef>
-                        <a:spcAft>
-                          <a:spcPts val="0"/>
-                        </a:spcAft>
-                        <a:buNone/>
-                      </a:pPr>
-                      <a:r>
-                        <a:rPr lang="en-US" sz="1800">
-                          <a:solidFill>
-                            <a:srgbClr val="000000"/>
-                          </a:solidFill>
-                        </a:rPr>
-                        <a:t>Data adhere to appropriate data types.</a:t>
-                      </a:r>
-                      <a:endParaRPr>
-                        <a:solidFill>
-                          <a:srgbClr val="000000"/>
-                        </a:solidFill>
-                      </a:endParaRPr>
-                    </a:p>
-                    <a:p>
-                      <a:pPr marL="0" marR="0" lvl="0" indent="0" algn="l" rtl="0">
-                        <a:spcBef>
-                          <a:spcPts val="0"/>
-                        </a:spcBef>
-                        <a:spcAft>
-                          <a:spcPts val="0"/>
-                        </a:spcAft>
-                        <a:buNone/>
-                      </a:pPr>
-                      <a:r>
-                        <a:rPr lang="en-US" sz="1800">
-                          <a:solidFill>
-                            <a:srgbClr val="000000"/>
-                          </a:solidFill>
-                        </a:rPr>
-                        <a:t>Data is clean.</a:t>
-                      </a:r>
-                      <a:endParaRPr>
-                        <a:solidFill>
-                          <a:srgbClr val="000000"/>
-                        </a:solidFill>
-                      </a:endParaRPr>
-                    </a:p>
-                  </a:txBody>
-                  <a:tcPr marL="91450" marR="91450" marT="45725" marB="45725"/>
-                </a:tc>
-                <a:extLst>
-                  <a:ext uri="{0D108BD9-81ED-4DB2-BD59-A6C34878D82A}">
-                    <a16:rowId xmlns:a16="http://schemas.microsoft.com/office/drawing/2014/main" val="10004"/>
-                  </a:ext>
-                </a:extLst>
-              </a:tr>
-              <a:tr h="380425">
-                <a:tc>
-                  <a:txBody>
-                    <a:bodyPr/>
-                    <a:lstStyle/>
-                    <a:p>
-                      <a:pPr marL="0" marR="0" lvl="0" indent="0" algn="l" rtl="0">
-                        <a:spcBef>
-                          <a:spcPts val="0"/>
-                        </a:spcBef>
-                        <a:spcAft>
-                          <a:spcPts val="0"/>
-                        </a:spcAft>
-                        <a:buNone/>
-                      </a:pPr>
-                      <a:r>
-                        <a:rPr lang="en-US" sz="1800">
-                          <a:solidFill>
-                            <a:srgbClr val="000000"/>
-                          </a:solidFill>
-                        </a:rPr>
-                        <a:t>Code Optimization</a:t>
-                      </a:r>
-                      <a:endParaRPr>
-                        <a:solidFill>
-                          <a:srgbClr val="000000"/>
-                        </a:solidFill>
-                      </a:endParaRPr>
-                    </a:p>
-                  </a:txBody>
-                  <a:tcPr marL="91450" marR="91450" marT="45725" marB="45725"/>
-                </a:tc>
-                <a:tc>
-                  <a:txBody>
-                    <a:bodyPr/>
-                    <a:lstStyle/>
-                    <a:p>
-                      <a:pPr marL="0" marR="0" lvl="0" indent="0" algn="l" rtl="0">
-                        <a:spcBef>
-                          <a:spcPts val="0"/>
-                        </a:spcBef>
-                        <a:spcAft>
-                          <a:spcPts val="0"/>
-                        </a:spcAft>
-                        <a:buNone/>
-                      </a:pPr>
-                      <a:r>
-                        <a:rPr lang="en-US" sz="1800">
-                          <a:solidFill>
-                            <a:srgbClr val="000000"/>
-                          </a:solidFill>
-                        </a:rPr>
-                        <a:t>SQL code optimized for storage or performance.</a:t>
-                      </a:r>
-                      <a:endParaRPr>
-                        <a:solidFill>
-                          <a:srgbClr val="000000"/>
-                        </a:solidFill>
-                      </a:endParaRPr>
-                    </a:p>
-                  </a:txBody>
-                  <a:tcPr marL="91450" marR="91450" marT="45725" marB="45725"/>
-                </a:tc>
-                <a:extLst>
-                  <a:ext uri="{0D108BD9-81ED-4DB2-BD59-A6C34878D82A}">
-                    <a16:rowId xmlns:a16="http://schemas.microsoft.com/office/drawing/2014/main" val="10005"/>
-                  </a:ext>
-                </a:extLst>
-              </a:tr>
-              <a:tr h="380425">
-                <a:tc>
-                  <a:txBody>
-                    <a:bodyPr/>
-                    <a:lstStyle/>
-                    <a:p>
-                      <a:pPr marL="0" marR="0" lvl="0" indent="0" algn="l" rtl="0">
-                        <a:spcBef>
-                          <a:spcPts val="0"/>
-                        </a:spcBef>
-                        <a:spcAft>
-                          <a:spcPts val="0"/>
-                        </a:spcAft>
-                        <a:buNone/>
-                      </a:pPr>
-                      <a:r>
-                        <a:rPr lang="en-US" sz="1800">
-                          <a:solidFill>
-                            <a:srgbClr val="000000"/>
-                          </a:solidFill>
-                        </a:rPr>
-                        <a:t>Database Creation</a:t>
-                      </a:r>
-                      <a:endParaRPr>
-                        <a:solidFill>
-                          <a:srgbClr val="000000"/>
-                        </a:solidFill>
-                      </a:endParaRPr>
-                    </a:p>
-                  </a:txBody>
-                  <a:tcPr marL="91450" marR="91450" marT="45725" marB="45725"/>
-                </a:tc>
-                <a:tc>
-                  <a:txBody>
-                    <a:bodyPr/>
-                    <a:lstStyle/>
-                    <a:p>
-                      <a:pPr marL="0" marR="0" lvl="0" indent="0" algn="l" rtl="0">
-                        <a:spcBef>
-                          <a:spcPts val="0"/>
-                        </a:spcBef>
-                        <a:spcAft>
-                          <a:spcPts val="0"/>
-                        </a:spcAft>
-                        <a:buNone/>
-                      </a:pPr>
-                      <a:r>
-                        <a:rPr lang="en-US" sz="1800">
-                          <a:solidFill>
-                            <a:srgbClr val="000000"/>
-                          </a:solidFill>
-                        </a:rPr>
-                        <a:t>Tables have appropriate constraints.</a:t>
-                      </a:r>
-                      <a:endParaRPr>
-                        <a:solidFill>
-                          <a:srgbClr val="000000"/>
-                        </a:solidFill>
-                      </a:endParaRPr>
-                    </a:p>
-                  </a:txBody>
-                  <a:tcPr marL="91450" marR="91450" marT="45725" marB="45725"/>
-                </a:tc>
-                <a:extLst>
-                  <a:ext uri="{0D108BD9-81ED-4DB2-BD59-A6C34878D82A}">
-                    <a16:rowId xmlns:a16="http://schemas.microsoft.com/office/drawing/2014/main" val="10006"/>
-                  </a:ext>
-                </a:extLst>
-              </a:tr>
-            </a:tbl>
-          </a:graphicData>
-        </a:graphic>
-      </p:graphicFrame>
     </p:spTree>
   </p:cSld>
   <p:clrMapOvr>

</xml_diff>